<commit_message>
Change in the title of of CONCEICAO..
</commit_message>
<xml_diff>
--- a/CONCEICAO_M_et_al_2024/ANALYSIS_OF_THE_BAT_VIROMA_(CAROLLIA_PERSPICILLATA)_IN_THE_BRAGANCA _PARA.pptx
+++ b/CONCEICAO_M_et_al_2024/ANALYSIS_OF_THE_BAT_VIROMA_(CAROLLIA_PERSPICILLATA)_IN_THE_BRAGANCA _PARA.pptx
@@ -118,7 +118,7 @@
           <a:p>
             <a:fld id="{DBB2B5FA-28DD-465B-9A1A-E8835235216F}" type="datetimeFigureOut">
               <a:rPr lang="pt-BR" smtClean="0"/>
-              <a:t>16/10/2024</a:t>
+              <a:t>15/12/2024</a:t>
             </a:fld>
             <a:endParaRPr lang="pt-BR"/>
           </a:p>
@@ -608,7 +608,7 @@
           <a:p>
             <a:fld id="{1D8BD707-D9CF-40AE-B4C6-C98DA3205C09}" type="datetimeFigureOut">
               <a:rPr lang="en-US"/>
-              <a:t>10/16/2024</a:t>
+              <a:t>12/15/2024</a:t>
             </a:fld>
             <a:endParaRPr lang="en-US"/>
           </a:p>
@@ -773,7 +773,7 @@
           <a:p>
             <a:fld id="{1D8BD707-D9CF-40AE-B4C6-C98DA3205C09}" type="datetimeFigureOut">
               <a:rPr lang="en-US"/>
-              <a:t>10/16/2024</a:t>
+              <a:t>12/15/2024</a:t>
             </a:fld>
             <a:endParaRPr lang="en-US"/>
           </a:p>
@@ -981,7 +981,7 @@
           <a:p>
             <a:fld id="{1D8BD707-D9CF-40AE-B4C6-C98DA3205C09}" type="datetimeFigureOut">
               <a:rPr lang="en-US"/>
-              <a:t>10/16/2024</a:t>
+              <a:t>12/15/2024</a:t>
             </a:fld>
             <a:endParaRPr lang="en-US"/>
           </a:p>
@@ -1123,7 +1123,7 @@
           <a:p>
             <a:fld id="{1D8BD707-D9CF-40AE-B4C6-C98DA3205C09}" type="datetimeFigureOut">
               <a:rPr lang="en-US"/>
-              <a:t>10/16/2024</a:t>
+              <a:t>12/15/2024</a:t>
             </a:fld>
             <a:endParaRPr lang="en-US"/>
           </a:p>
@@ -1242,7 +1242,7 @@
           <a:p>
             <a:fld id="{1D8BD707-D9CF-40AE-B4C6-C98DA3205C09}" type="datetimeFigureOut">
               <a:rPr lang="en-US"/>
-              <a:t>10/16/2024</a:t>
+              <a:t>12/15/2024</a:t>
             </a:fld>
             <a:endParaRPr lang="en-US"/>
           </a:p>
@@ -1477,7 +1477,7 @@
           <a:p>
             <a:fld id="{1D8BD707-D9CF-40AE-B4C6-C98DA3205C09}" type="datetimeFigureOut">
               <a:rPr lang="en-US"/>
-              <a:t>10/16/2024</a:t>
+              <a:t>12/15/2024</a:t>
             </a:fld>
             <a:endParaRPr lang="en-US"/>
           </a:p>
@@ -8078,7 +8078,7 @@
             </a:r>
             <a:r>
               <a:rPr lang="en-US" sz="3600" b="1" dirty="0"/>
-              <a:t>) in the </a:t>
+              <a:t>) in </a:t>
             </a:r>
             <a:r>
               <a:rPr lang="en-US" sz="3600" b="1" dirty="0" err="1"/>
@@ -8086,7 +8086,7 @@
             </a:r>
             <a:r>
               <a:rPr lang="en-US" sz="3600" b="1" dirty="0"/>
-              <a:t> Pará </a:t>
+              <a:t>, Pará </a:t>
             </a:r>
             <a:endParaRPr lang="pt-BR" sz="3600" b="1" dirty="0"/>
           </a:p>

</xml_diff>